<commit_message>
annotation tool ready for study
</commit_message>
<xml_diff>
--- a/user-study/Instructions.pptx
+++ b/user-study/Instructions.pptx
@@ -9,6 +9,10 @@
     <p:sldId id="259" r:id="rId3"/>
     <p:sldId id="260" r:id="rId4"/>
     <p:sldId id="261" r:id="rId5"/>
+    <p:sldId id="262" r:id="rId6"/>
+    <p:sldId id="263" r:id="rId7"/>
+    <p:sldId id="264" r:id="rId8"/>
+    <p:sldId id="265" r:id="rId9"/>
   </p:sldIdLst>
   <p:sldSz cx="12192000" cy="6858000"/>
   <p:notesSz cx="6858000" cy="9144000"/>
@@ -107,6 +111,11 @@
       </a:defRPr>
     </a:lvl9pPr>
   </p:defaultTextStyle>
+  <p:extLst>
+    <p:ext uri="{EFAFB233-063F-42B5-8137-9DF3F51BA10A}">
+      <p15:sldGuideLst xmlns:p15="http://schemas.microsoft.com/office/powerpoint/2012/main"/>
+    </p:ext>
+  </p:extLst>
 </p:presentation>
 </file>
 
@@ -257,7 +266,7 @@
           <a:p>
             <a:fld id="{D98ADB59-0FC3-4F23-98C1-896570F2CCB9}" type="datetimeFigureOut">
               <a:rPr lang="en-US" smtClean="0"/>
-              <a:t>4/13/2020</a:t>
+              <a:t>4/16/2020</a:t>
             </a:fld>
             <a:endParaRPr lang="en-US"/>
           </a:p>
@@ -455,7 +464,7 @@
           <a:p>
             <a:fld id="{D98ADB59-0FC3-4F23-98C1-896570F2CCB9}" type="datetimeFigureOut">
               <a:rPr lang="en-US" smtClean="0"/>
-              <a:t>4/13/2020</a:t>
+              <a:t>4/16/2020</a:t>
             </a:fld>
             <a:endParaRPr lang="en-US"/>
           </a:p>
@@ -663,7 +672,7 @@
           <a:p>
             <a:fld id="{D98ADB59-0FC3-4F23-98C1-896570F2CCB9}" type="datetimeFigureOut">
               <a:rPr lang="en-US" smtClean="0"/>
-              <a:t>4/13/2020</a:t>
+              <a:t>4/16/2020</a:t>
             </a:fld>
             <a:endParaRPr lang="en-US"/>
           </a:p>
@@ -861,7 +870,7 @@
           <a:p>
             <a:fld id="{D98ADB59-0FC3-4F23-98C1-896570F2CCB9}" type="datetimeFigureOut">
               <a:rPr lang="en-US" smtClean="0"/>
-              <a:t>4/13/2020</a:t>
+              <a:t>4/16/2020</a:t>
             </a:fld>
             <a:endParaRPr lang="en-US"/>
           </a:p>
@@ -1136,7 +1145,7 @@
           <a:p>
             <a:fld id="{D98ADB59-0FC3-4F23-98C1-896570F2CCB9}" type="datetimeFigureOut">
               <a:rPr lang="en-US" smtClean="0"/>
-              <a:t>4/13/2020</a:t>
+              <a:t>4/16/2020</a:t>
             </a:fld>
             <a:endParaRPr lang="en-US"/>
           </a:p>
@@ -1401,7 +1410,7 @@
           <a:p>
             <a:fld id="{D98ADB59-0FC3-4F23-98C1-896570F2CCB9}" type="datetimeFigureOut">
               <a:rPr lang="en-US" smtClean="0"/>
-              <a:t>4/13/2020</a:t>
+              <a:t>4/16/2020</a:t>
             </a:fld>
             <a:endParaRPr lang="en-US"/>
           </a:p>
@@ -1813,7 +1822,7 @@
           <a:p>
             <a:fld id="{D98ADB59-0FC3-4F23-98C1-896570F2CCB9}" type="datetimeFigureOut">
               <a:rPr lang="en-US" smtClean="0"/>
-              <a:t>4/13/2020</a:t>
+              <a:t>4/16/2020</a:t>
             </a:fld>
             <a:endParaRPr lang="en-US"/>
           </a:p>
@@ -1954,7 +1963,7 @@
           <a:p>
             <a:fld id="{D98ADB59-0FC3-4F23-98C1-896570F2CCB9}" type="datetimeFigureOut">
               <a:rPr lang="en-US" smtClean="0"/>
-              <a:t>4/13/2020</a:t>
+              <a:t>4/16/2020</a:t>
             </a:fld>
             <a:endParaRPr lang="en-US"/>
           </a:p>
@@ -2067,7 +2076,7 @@
           <a:p>
             <a:fld id="{D98ADB59-0FC3-4F23-98C1-896570F2CCB9}" type="datetimeFigureOut">
               <a:rPr lang="en-US" smtClean="0"/>
-              <a:t>4/13/2020</a:t>
+              <a:t>4/16/2020</a:t>
             </a:fld>
             <a:endParaRPr lang="en-US"/>
           </a:p>
@@ -2378,7 +2387,7 @@
           <a:p>
             <a:fld id="{D98ADB59-0FC3-4F23-98C1-896570F2CCB9}" type="datetimeFigureOut">
               <a:rPr lang="en-US" smtClean="0"/>
-              <a:t>4/13/2020</a:t>
+              <a:t>4/16/2020</a:t>
             </a:fld>
             <a:endParaRPr lang="en-US"/>
           </a:p>
@@ -2666,7 +2675,7 @@
           <a:p>
             <a:fld id="{D98ADB59-0FC3-4F23-98C1-896570F2CCB9}" type="datetimeFigureOut">
               <a:rPr lang="en-US" smtClean="0"/>
-              <a:t>4/13/2020</a:t>
+              <a:t>4/16/2020</a:t>
             </a:fld>
             <a:endParaRPr lang="en-US"/>
           </a:p>
@@ -2907,7 +2916,7 @@
           <a:p>
             <a:fld id="{D98ADB59-0FC3-4F23-98C1-896570F2CCB9}" type="datetimeFigureOut">
               <a:rPr lang="en-US" smtClean="0"/>
-              <a:t>4/13/2020</a:t>
+              <a:t>4/16/2020</a:t>
             </a:fld>
             <a:endParaRPr lang="en-US"/>
           </a:p>
@@ -4756,6 +4765,1297 @@
 </p:sld>
 </file>
 
+<file path=ppt/slides/slide5.xml><?xml version="1.0" encoding="utf-8"?>
+<p:sld xmlns:a="http://schemas.openxmlformats.org/drawingml/2006/main" xmlns:r="http://schemas.openxmlformats.org/officeDocument/2006/relationships" xmlns:p="http://schemas.openxmlformats.org/presentationml/2006/main">
+  <p:cSld>
+    <p:spTree>
+      <p:nvGrpSpPr>
+        <p:cNvPr id="1" name=""/>
+        <p:cNvGrpSpPr/>
+        <p:nvPr/>
+      </p:nvGrpSpPr>
+      <p:grpSpPr>
+        <a:xfrm>
+          <a:off x="0" y="0"/>
+          <a:ext cx="0" cy="0"/>
+          <a:chOff x="0" y="0"/>
+          <a:chExt cx="0" cy="0"/>
+        </a:xfrm>
+      </p:grpSpPr>
+      <p:sp>
+        <p:nvSpPr>
+          <p:cNvPr id="12" name="TextBox 11">
+            <a:extLst>
+              <a:ext uri="{FF2B5EF4-FFF2-40B4-BE49-F238E27FC236}">
+                <a16:creationId xmlns:a16="http://schemas.microsoft.com/office/drawing/2014/main" id="{6F47644D-4FE7-4674-9EFA-0ACF336A3139}"/>
+              </a:ext>
+            </a:extLst>
+          </p:cNvPr>
+          <p:cNvSpPr txBox="1"/>
+          <p:nvPr/>
+        </p:nvSpPr>
+        <p:spPr>
+          <a:xfrm>
+            <a:off x="834816" y="546854"/>
+            <a:ext cx="7998288" cy="369332"/>
+          </a:xfrm>
+          <a:prstGeom prst="rect">
+            <a:avLst/>
+          </a:prstGeom>
+          <a:noFill/>
+        </p:spPr>
+        <p:txBody>
+          <a:bodyPr wrap="square" rtlCol="0">
+            <a:spAutoFit/>
+          </a:bodyPr>
+          <a:lstStyle/>
+          <a:p>
+            <a:r>
+              <a:rPr lang="en-US" dirty="0"/>
+              <a:t>Select the </a:t>
+            </a:r>
+            <a:r>
+              <a:rPr lang="en-US" dirty="0">
+                <a:highlight>
+                  <a:srgbClr val="FFFF00"/>
+                </a:highlight>
+              </a:rPr>
+              <a:t>salient areas </a:t>
+            </a:r>
+            <a:r>
+              <a:rPr lang="en-US" dirty="0"/>
+              <a:t>that is mostly </a:t>
+            </a:r>
+            <a:r>
+              <a:rPr lang="en-US" dirty="0">
+                <a:highlight>
+                  <a:srgbClr val="FFFF00"/>
+                </a:highlight>
+              </a:rPr>
+              <a:t>explaining pets</a:t>
+            </a:r>
+            <a:r>
+              <a:rPr lang="en-US" dirty="0"/>
+              <a:t> in the image in your opinion.</a:t>
+            </a:r>
+          </a:p>
+        </p:txBody>
+      </p:sp>
+      <p:sp>
+        <p:nvSpPr>
+          <p:cNvPr id="3" name="Rectangle: Rounded Corners 2">
+            <a:extLst>
+              <a:ext uri="{FF2B5EF4-FFF2-40B4-BE49-F238E27FC236}">
+                <a16:creationId xmlns:a16="http://schemas.microsoft.com/office/drawing/2014/main" id="{DDF11BA7-53E3-4E47-B996-3EDC15F2BFCA}"/>
+              </a:ext>
+            </a:extLst>
+          </p:cNvPr>
+          <p:cNvSpPr/>
+          <p:nvPr/>
+        </p:nvSpPr>
+        <p:spPr>
+          <a:xfrm>
+            <a:off x="834816" y="519422"/>
+            <a:ext cx="7724186" cy="409907"/>
+          </a:xfrm>
+          <a:prstGeom prst="roundRect">
+            <a:avLst/>
+          </a:prstGeom>
+          <a:noFill/>
+          <a:ln w="28575" cap="flat" cmpd="sng" algn="ctr">
+            <a:solidFill>
+              <a:schemeClr val="accent1">
+                <a:lumMod val="50000"/>
+              </a:schemeClr>
+            </a:solidFill>
+            <a:prstDash val="solid"/>
+            <a:round/>
+            <a:headEnd type="none" w="med" len="med"/>
+            <a:tailEnd type="none" w="med" len="med"/>
+          </a:ln>
+        </p:spPr>
+        <p:style>
+          <a:lnRef idx="0">
+            <a:scrgbClr r="0" g="0" b="0"/>
+          </a:lnRef>
+          <a:fillRef idx="0">
+            <a:scrgbClr r="0" g="0" b="0"/>
+          </a:fillRef>
+          <a:effectRef idx="0">
+            <a:scrgbClr r="0" g="0" b="0"/>
+          </a:effectRef>
+          <a:fontRef idx="minor">
+            <a:schemeClr val="accent2"/>
+          </a:fontRef>
+        </p:style>
+        <p:txBody>
+          <a:bodyPr rtlCol="0" anchor="ctr"/>
+          <a:lstStyle/>
+          <a:p>
+            <a:pPr algn="ctr"/>
+            <a:endParaRPr lang="en-US"/>
+          </a:p>
+        </p:txBody>
+      </p:sp>
+      <p:cxnSp>
+        <p:nvCxnSpPr>
+          <p:cNvPr id="18" name="Straight Arrow Connector 17">
+            <a:extLst>
+              <a:ext uri="{FF2B5EF4-FFF2-40B4-BE49-F238E27FC236}">
+                <a16:creationId xmlns:a16="http://schemas.microsoft.com/office/drawing/2014/main" id="{6E020DE6-56F8-46C9-B444-D83EE302A217}"/>
+              </a:ext>
+            </a:extLst>
+          </p:cNvPr>
+          <p:cNvCxnSpPr>
+            <a:cxnSpLocks/>
+          </p:cNvCxnSpPr>
+          <p:nvPr/>
+        </p:nvCxnSpPr>
+        <p:spPr>
+          <a:xfrm>
+            <a:off x="6367211" y="3950208"/>
+            <a:ext cx="0" cy="2003309"/>
+          </a:xfrm>
+          <a:prstGeom prst="straightConnector1">
+            <a:avLst/>
+          </a:prstGeom>
+          <a:ln w="38100">
+            <a:solidFill>
+              <a:srgbClr val="FF0000"/>
+            </a:solidFill>
+            <a:headEnd type="oval" w="med" len="med"/>
+            <a:tailEnd type="triangle" w="med" len="med"/>
+          </a:ln>
+        </p:spPr>
+        <p:style>
+          <a:lnRef idx="1">
+            <a:schemeClr val="accent1"/>
+          </a:lnRef>
+          <a:fillRef idx="0">
+            <a:schemeClr val="accent1"/>
+          </a:fillRef>
+          <a:effectRef idx="0">
+            <a:schemeClr val="accent1"/>
+          </a:effectRef>
+          <a:fontRef idx="minor">
+            <a:schemeClr val="tx1"/>
+          </a:fontRef>
+        </p:style>
+      </p:cxnSp>
+      <p:cxnSp>
+        <p:nvCxnSpPr>
+          <p:cNvPr id="20" name="Straight Arrow Connector 19">
+            <a:extLst>
+              <a:ext uri="{FF2B5EF4-FFF2-40B4-BE49-F238E27FC236}">
+                <a16:creationId xmlns:a16="http://schemas.microsoft.com/office/drawing/2014/main" id="{2AC048D2-82C4-45D2-B22A-10F8D00D73F0}"/>
+              </a:ext>
+            </a:extLst>
+          </p:cNvPr>
+          <p:cNvCxnSpPr>
+            <a:cxnSpLocks/>
+            <a:stCxn id="7" idx="3"/>
+          </p:cNvCxnSpPr>
+          <p:nvPr/>
+        </p:nvCxnSpPr>
+        <p:spPr>
+          <a:xfrm flipV="1">
+            <a:off x="3069512" y="2278555"/>
+            <a:ext cx="2967202" cy="1117348"/>
+          </a:xfrm>
+          <a:prstGeom prst="straightConnector1">
+            <a:avLst/>
+          </a:prstGeom>
+          <a:ln w="38100">
+            <a:solidFill>
+              <a:schemeClr val="accent1">
+                <a:lumMod val="50000"/>
+              </a:schemeClr>
+            </a:solidFill>
+            <a:headEnd type="oval" w="med" len="med"/>
+            <a:tailEnd type="triangle" w="med" len="med"/>
+          </a:ln>
+        </p:spPr>
+        <p:style>
+          <a:lnRef idx="1">
+            <a:schemeClr val="accent1"/>
+          </a:lnRef>
+          <a:fillRef idx="0">
+            <a:schemeClr val="accent1"/>
+          </a:fillRef>
+          <a:effectRef idx="0">
+            <a:schemeClr val="accent1"/>
+          </a:effectRef>
+          <a:fontRef idx="minor">
+            <a:schemeClr val="tx1"/>
+          </a:fontRef>
+        </p:style>
+      </p:cxnSp>
+      <p:pic>
+        <p:nvPicPr>
+          <p:cNvPr id="6" name="Picture 5">
+            <a:extLst>
+              <a:ext uri="{FF2B5EF4-FFF2-40B4-BE49-F238E27FC236}">
+                <a16:creationId xmlns:a16="http://schemas.microsoft.com/office/drawing/2014/main" id="{6EABFFDF-D864-48A4-A731-1E34E16B9CCE}"/>
+              </a:ext>
+            </a:extLst>
+          </p:cNvPr>
+          <p:cNvPicPr>
+            <a:picLocks noChangeAspect="1"/>
+          </p:cNvPicPr>
+          <p:nvPr/>
+        </p:nvPicPr>
+        <p:blipFill>
+          <a:blip r:embed="rId2"/>
+          <a:stretch>
+            <a:fillRect/>
+          </a:stretch>
+        </p:blipFill>
+        <p:spPr>
+          <a:xfrm>
+            <a:off x="6096000" y="1042037"/>
+            <a:ext cx="2463002" cy="2473035"/>
+          </a:xfrm>
+          <a:prstGeom prst="rect">
+            <a:avLst/>
+          </a:prstGeom>
+        </p:spPr>
+      </p:pic>
+      <p:pic>
+        <p:nvPicPr>
+          <p:cNvPr id="7" name="Picture 6">
+            <a:extLst>
+              <a:ext uri="{FF2B5EF4-FFF2-40B4-BE49-F238E27FC236}">
+                <a16:creationId xmlns:a16="http://schemas.microsoft.com/office/drawing/2014/main" id="{570BDDBD-BF1A-4597-BFE2-E5A0085FF55C}"/>
+              </a:ext>
+            </a:extLst>
+          </p:cNvPr>
+          <p:cNvPicPr>
+            <a:picLocks noChangeAspect="1"/>
+          </p:cNvPicPr>
+          <p:nvPr/>
+        </p:nvPicPr>
+        <p:blipFill>
+          <a:blip r:embed="rId3"/>
+          <a:stretch>
+            <a:fillRect/>
+          </a:stretch>
+        </p:blipFill>
+        <p:spPr>
+          <a:xfrm>
+            <a:off x="834816" y="2278555"/>
+            <a:ext cx="2234696" cy="2234696"/>
+          </a:xfrm>
+          <a:prstGeom prst="rect">
+            <a:avLst/>
+          </a:prstGeom>
+        </p:spPr>
+      </p:pic>
+      <p:pic>
+        <p:nvPicPr>
+          <p:cNvPr id="8" name="Picture 7">
+            <a:extLst>
+              <a:ext uri="{FF2B5EF4-FFF2-40B4-BE49-F238E27FC236}">
+                <a16:creationId xmlns:a16="http://schemas.microsoft.com/office/drawing/2014/main" id="{1B41120A-A882-4E6E-B5AE-59E25519FEF0}"/>
+              </a:ext>
+            </a:extLst>
+          </p:cNvPr>
+          <p:cNvPicPr>
+            <a:picLocks noChangeAspect="1"/>
+          </p:cNvPicPr>
+          <p:nvPr/>
+        </p:nvPicPr>
+        <p:blipFill>
+          <a:blip r:embed="rId4"/>
+          <a:stretch>
+            <a:fillRect/>
+          </a:stretch>
+        </p:blipFill>
+        <p:spPr>
+          <a:xfrm>
+            <a:off x="6130073" y="3715345"/>
+            <a:ext cx="2488147" cy="2473036"/>
+          </a:xfrm>
+          <a:prstGeom prst="rect">
+            <a:avLst/>
+          </a:prstGeom>
+        </p:spPr>
+      </p:pic>
+      <p:cxnSp>
+        <p:nvCxnSpPr>
+          <p:cNvPr id="16" name="Straight Arrow Connector 15">
+            <a:extLst>
+              <a:ext uri="{FF2B5EF4-FFF2-40B4-BE49-F238E27FC236}">
+                <a16:creationId xmlns:a16="http://schemas.microsoft.com/office/drawing/2014/main" id="{0537B9D5-9E04-4A4D-860E-45A2F68569F2}"/>
+              </a:ext>
+            </a:extLst>
+          </p:cNvPr>
+          <p:cNvCxnSpPr>
+            <a:cxnSpLocks/>
+            <a:stCxn id="7" idx="3"/>
+          </p:cNvCxnSpPr>
+          <p:nvPr/>
+        </p:nvCxnSpPr>
+        <p:spPr>
+          <a:xfrm>
+            <a:off x="3069512" y="3395903"/>
+            <a:ext cx="2967202" cy="1249249"/>
+          </a:xfrm>
+          <a:prstGeom prst="straightConnector1">
+            <a:avLst/>
+          </a:prstGeom>
+          <a:ln w="38100">
+            <a:solidFill>
+              <a:schemeClr val="accent1">
+                <a:lumMod val="50000"/>
+              </a:schemeClr>
+            </a:solidFill>
+            <a:headEnd type="oval" w="med" len="med"/>
+            <a:tailEnd type="triangle" w="med" len="med"/>
+          </a:ln>
+        </p:spPr>
+        <p:style>
+          <a:lnRef idx="1">
+            <a:schemeClr val="accent1"/>
+          </a:lnRef>
+          <a:fillRef idx="0">
+            <a:schemeClr val="accent1"/>
+          </a:fillRef>
+          <a:effectRef idx="0">
+            <a:schemeClr val="accent1"/>
+          </a:effectRef>
+          <a:fontRef idx="minor">
+            <a:schemeClr val="tx1"/>
+          </a:fontRef>
+        </p:style>
+      </p:cxnSp>
+      <p:sp>
+        <p:nvSpPr>
+          <p:cNvPr id="22" name="TextBox 21">
+            <a:extLst>
+              <a:ext uri="{FF2B5EF4-FFF2-40B4-BE49-F238E27FC236}">
+                <a16:creationId xmlns:a16="http://schemas.microsoft.com/office/drawing/2014/main" id="{13617C29-7C4C-4D91-8858-747749E47ED2}"/>
+              </a:ext>
+            </a:extLst>
+          </p:cNvPr>
+          <p:cNvSpPr txBox="1"/>
+          <p:nvPr/>
+        </p:nvSpPr>
+        <p:spPr>
+          <a:xfrm rot="20419155">
+            <a:off x="4195298" y="2537275"/>
+            <a:ext cx="1088683" cy="373025"/>
+          </a:xfrm>
+          <a:prstGeom prst="rect">
+            <a:avLst/>
+          </a:prstGeom>
+          <a:solidFill>
+            <a:schemeClr val="bg1"/>
+          </a:solidFill>
+          <a:ln>
+            <a:solidFill>
+              <a:srgbClr val="FF0000"/>
+            </a:solidFill>
+          </a:ln>
+        </p:spPr>
+        <p:style>
+          <a:lnRef idx="2">
+            <a:schemeClr val="accent2"/>
+          </a:lnRef>
+          <a:fillRef idx="1">
+            <a:schemeClr val="lt1"/>
+          </a:fillRef>
+          <a:effectRef idx="0">
+            <a:schemeClr val="accent2"/>
+          </a:effectRef>
+          <a:fontRef idx="minor">
+            <a:schemeClr val="dk1"/>
+          </a:fontRef>
+        </p:style>
+        <p:txBody>
+          <a:bodyPr wrap="square" rtlCol="0">
+            <a:spAutoFit/>
+          </a:bodyPr>
+          <a:lstStyle/>
+          <a:p>
+            <a:r>
+              <a:rPr lang="en-US" dirty="0"/>
+              <a:t>This way</a:t>
+            </a:r>
+          </a:p>
+        </p:txBody>
+      </p:sp>
+      <p:sp>
+        <p:nvSpPr>
+          <p:cNvPr id="19" name="TextBox 18">
+            <a:extLst>
+              <a:ext uri="{FF2B5EF4-FFF2-40B4-BE49-F238E27FC236}">
+                <a16:creationId xmlns:a16="http://schemas.microsoft.com/office/drawing/2014/main" id="{FAC63419-3218-4C4F-BB61-EFA0934C48D6}"/>
+              </a:ext>
+            </a:extLst>
+          </p:cNvPr>
+          <p:cNvSpPr txBox="1"/>
+          <p:nvPr/>
+        </p:nvSpPr>
+        <p:spPr>
+          <a:xfrm rot="1496516">
+            <a:off x="4029232" y="3861564"/>
+            <a:ext cx="1420813" cy="369332"/>
+          </a:xfrm>
+          <a:prstGeom prst="rect">
+            <a:avLst/>
+          </a:prstGeom>
+          <a:solidFill>
+            <a:schemeClr val="bg1"/>
+          </a:solidFill>
+          <a:ln>
+            <a:solidFill>
+              <a:srgbClr val="FF0000"/>
+            </a:solidFill>
+          </a:ln>
+        </p:spPr>
+        <p:style>
+          <a:lnRef idx="2">
+            <a:schemeClr val="accent2"/>
+          </a:lnRef>
+          <a:fillRef idx="1">
+            <a:schemeClr val="lt1"/>
+          </a:fillRef>
+          <a:effectRef idx="0">
+            <a:schemeClr val="accent2"/>
+          </a:effectRef>
+          <a:fontRef idx="minor">
+            <a:schemeClr val="dk1"/>
+          </a:fontRef>
+        </p:style>
+        <p:txBody>
+          <a:bodyPr wrap="square" rtlCol="0">
+            <a:spAutoFit/>
+          </a:bodyPr>
+          <a:lstStyle/>
+          <a:p>
+            <a:r>
+              <a:rPr lang="en-US" dirty="0"/>
+              <a:t>or this way</a:t>
+            </a:r>
+          </a:p>
+        </p:txBody>
+      </p:sp>
+      <p:cxnSp>
+        <p:nvCxnSpPr>
+          <p:cNvPr id="21" name="Straight Arrow Connector 20">
+            <a:extLst>
+              <a:ext uri="{FF2B5EF4-FFF2-40B4-BE49-F238E27FC236}">
+                <a16:creationId xmlns:a16="http://schemas.microsoft.com/office/drawing/2014/main" id="{1912CA4A-5F54-4C11-9413-8E489B1823F7}"/>
+              </a:ext>
+            </a:extLst>
+          </p:cNvPr>
+          <p:cNvCxnSpPr>
+            <a:cxnSpLocks/>
+            <a:stCxn id="7" idx="3"/>
+          </p:cNvCxnSpPr>
+          <p:nvPr/>
+        </p:nvCxnSpPr>
+        <p:spPr>
+          <a:xfrm>
+            <a:off x="3069512" y="3395903"/>
+            <a:ext cx="1754057" cy="2401393"/>
+          </a:xfrm>
+          <a:prstGeom prst="straightConnector1">
+            <a:avLst/>
+          </a:prstGeom>
+          <a:ln w="38100">
+            <a:solidFill>
+              <a:schemeClr val="accent1">
+                <a:lumMod val="50000"/>
+              </a:schemeClr>
+            </a:solidFill>
+            <a:headEnd type="oval" w="med" len="med"/>
+            <a:tailEnd type="triangle" w="med" len="med"/>
+          </a:ln>
+        </p:spPr>
+        <p:style>
+          <a:lnRef idx="1">
+            <a:schemeClr val="accent1"/>
+          </a:lnRef>
+          <a:fillRef idx="0">
+            <a:schemeClr val="accent1"/>
+          </a:fillRef>
+          <a:effectRef idx="0">
+            <a:schemeClr val="accent1"/>
+          </a:effectRef>
+          <a:fontRef idx="minor">
+            <a:schemeClr val="tx1"/>
+          </a:fontRef>
+        </p:style>
+      </p:cxnSp>
+      <p:sp>
+        <p:nvSpPr>
+          <p:cNvPr id="23" name="TextBox 22">
+            <a:extLst>
+              <a:ext uri="{FF2B5EF4-FFF2-40B4-BE49-F238E27FC236}">
+                <a16:creationId xmlns:a16="http://schemas.microsoft.com/office/drawing/2014/main" id="{B771FD52-262C-4825-8604-A448A712DEAD}"/>
+              </a:ext>
+            </a:extLst>
+          </p:cNvPr>
+          <p:cNvSpPr txBox="1"/>
+          <p:nvPr/>
+        </p:nvSpPr>
+        <p:spPr>
+          <a:xfrm rot="3375240">
+            <a:off x="3616274" y="4759559"/>
+            <a:ext cx="1519482" cy="923330"/>
+          </a:xfrm>
+          <a:prstGeom prst="rect">
+            <a:avLst/>
+          </a:prstGeom>
+          <a:solidFill>
+            <a:schemeClr val="bg1"/>
+          </a:solidFill>
+          <a:ln>
+            <a:solidFill>
+              <a:srgbClr val="FF0000"/>
+            </a:solidFill>
+          </a:ln>
+        </p:spPr>
+        <p:style>
+          <a:lnRef idx="2">
+            <a:schemeClr val="accent2"/>
+          </a:lnRef>
+          <a:fillRef idx="1">
+            <a:schemeClr val="lt1"/>
+          </a:fillRef>
+          <a:effectRef idx="0">
+            <a:schemeClr val="accent2"/>
+          </a:effectRef>
+          <a:fontRef idx="minor">
+            <a:schemeClr val="dk1"/>
+          </a:fontRef>
+        </p:style>
+        <p:txBody>
+          <a:bodyPr wrap="square" rtlCol="0">
+            <a:spAutoFit/>
+          </a:bodyPr>
+          <a:lstStyle/>
+          <a:p>
+            <a:pPr algn="ctr"/>
+            <a:r>
+              <a:rPr lang="en-US" dirty="0"/>
+              <a:t>or any other salient region that you find</a:t>
+            </a:r>
+          </a:p>
+        </p:txBody>
+      </p:sp>
+    </p:spTree>
+    <p:extLst>
+      <p:ext uri="{BB962C8B-B14F-4D97-AF65-F5344CB8AC3E}">
+        <p14:creationId xmlns:p14="http://schemas.microsoft.com/office/powerpoint/2010/main" val="3127512525"/>
+      </p:ext>
+    </p:extLst>
+  </p:cSld>
+  <p:clrMapOvr>
+    <a:masterClrMapping/>
+  </p:clrMapOvr>
+</p:sld>
+</file>
+
+<file path=ppt/slides/slide6.xml><?xml version="1.0" encoding="utf-8"?>
+<p:sld xmlns:a="http://schemas.openxmlformats.org/drawingml/2006/main" xmlns:r="http://schemas.openxmlformats.org/officeDocument/2006/relationships" xmlns:p="http://schemas.openxmlformats.org/presentationml/2006/main">
+  <p:cSld>
+    <p:spTree>
+      <p:nvGrpSpPr>
+        <p:cNvPr id="1" name=""/>
+        <p:cNvGrpSpPr/>
+        <p:nvPr/>
+      </p:nvGrpSpPr>
+      <p:grpSpPr>
+        <a:xfrm>
+          <a:off x="0" y="0"/>
+          <a:ext cx="0" cy="0"/>
+          <a:chOff x="0" y="0"/>
+          <a:chExt cx="0" cy="0"/>
+        </a:xfrm>
+      </p:grpSpPr>
+      <p:pic>
+        <p:nvPicPr>
+          <p:cNvPr id="5" name="Picture 4">
+            <a:extLst>
+              <a:ext uri="{FF2B5EF4-FFF2-40B4-BE49-F238E27FC236}">
+                <a16:creationId xmlns:a16="http://schemas.microsoft.com/office/drawing/2014/main" id="{87AA6251-CC99-47F8-A6A0-14838863760C}"/>
+              </a:ext>
+            </a:extLst>
+          </p:cNvPr>
+          <p:cNvPicPr>
+            <a:picLocks noChangeAspect="1"/>
+          </p:cNvPicPr>
+          <p:nvPr/>
+        </p:nvPicPr>
+        <p:blipFill>
+          <a:blip r:embed="rId2"/>
+          <a:stretch>
+            <a:fillRect/>
+          </a:stretch>
+        </p:blipFill>
+        <p:spPr>
+          <a:xfrm>
+            <a:off x="2777628" y="1421747"/>
+            <a:ext cx="5092307" cy="4243589"/>
+          </a:xfrm>
+          <a:prstGeom prst="rect">
+            <a:avLst/>
+          </a:prstGeom>
+        </p:spPr>
+      </p:pic>
+      <p:cxnSp>
+        <p:nvCxnSpPr>
+          <p:cNvPr id="11" name="Straight Arrow Connector 10">
+            <a:extLst>
+              <a:ext uri="{FF2B5EF4-FFF2-40B4-BE49-F238E27FC236}">
+                <a16:creationId xmlns:a16="http://schemas.microsoft.com/office/drawing/2014/main" id="{96787E16-0E97-4C05-ADFC-3B93F407678A}"/>
+              </a:ext>
+            </a:extLst>
+          </p:cNvPr>
+          <p:cNvCxnSpPr>
+            <a:cxnSpLocks/>
+          </p:cNvCxnSpPr>
+          <p:nvPr/>
+        </p:nvCxnSpPr>
+        <p:spPr>
+          <a:xfrm flipV="1">
+            <a:off x="5170932" y="1281168"/>
+            <a:ext cx="0" cy="760329"/>
+          </a:xfrm>
+          <a:prstGeom prst="straightConnector1">
+            <a:avLst/>
+          </a:prstGeom>
+          <a:ln w="38100">
+            <a:solidFill>
+              <a:srgbClr val="FF0000"/>
+            </a:solidFill>
+            <a:tailEnd type="triangle"/>
+          </a:ln>
+        </p:spPr>
+        <p:style>
+          <a:lnRef idx="1">
+            <a:schemeClr val="accent1"/>
+          </a:lnRef>
+          <a:fillRef idx="0">
+            <a:schemeClr val="accent1"/>
+          </a:fillRef>
+          <a:effectRef idx="0">
+            <a:schemeClr val="accent1"/>
+          </a:effectRef>
+          <a:fontRef idx="minor">
+            <a:schemeClr val="tx1"/>
+          </a:fontRef>
+        </p:style>
+      </p:cxnSp>
+      <p:sp>
+        <p:nvSpPr>
+          <p:cNvPr id="12" name="TextBox 11">
+            <a:extLst>
+              <a:ext uri="{FF2B5EF4-FFF2-40B4-BE49-F238E27FC236}">
+                <a16:creationId xmlns:a16="http://schemas.microsoft.com/office/drawing/2014/main" id="{6F47644D-4FE7-4674-9EFA-0ACF336A3139}"/>
+              </a:ext>
+            </a:extLst>
+          </p:cNvPr>
+          <p:cNvSpPr txBox="1"/>
+          <p:nvPr/>
+        </p:nvSpPr>
+        <p:spPr>
+          <a:xfrm>
+            <a:off x="3438144" y="923827"/>
+            <a:ext cx="3602736" cy="369332"/>
+          </a:xfrm>
+          <a:prstGeom prst="rect">
+            <a:avLst/>
+          </a:prstGeom>
+          <a:noFill/>
+        </p:spPr>
+        <p:txBody>
+          <a:bodyPr wrap="square" rtlCol="0">
+            <a:spAutoFit/>
+          </a:bodyPr>
+          <a:lstStyle/>
+          <a:p>
+            <a:r>
+              <a:rPr lang="en-US" dirty="0"/>
+              <a:t>User mouse to draw around pets</a:t>
+            </a:r>
+          </a:p>
+        </p:txBody>
+      </p:sp>
+      <p:sp>
+        <p:nvSpPr>
+          <p:cNvPr id="3" name="Rectangle: Rounded Corners 2">
+            <a:extLst>
+              <a:ext uri="{FF2B5EF4-FFF2-40B4-BE49-F238E27FC236}">
+                <a16:creationId xmlns:a16="http://schemas.microsoft.com/office/drawing/2014/main" id="{DDF11BA7-53E3-4E47-B996-3EDC15F2BFCA}"/>
+              </a:ext>
+            </a:extLst>
+          </p:cNvPr>
+          <p:cNvSpPr/>
+          <p:nvPr/>
+        </p:nvSpPr>
+        <p:spPr>
+          <a:xfrm>
+            <a:off x="2777629" y="2048256"/>
+            <a:ext cx="4345543" cy="347472"/>
+          </a:xfrm>
+          <a:prstGeom prst="roundRect">
+            <a:avLst/>
+          </a:prstGeom>
+          <a:noFill/>
+          <a:ln w="28575" cap="flat" cmpd="sng" algn="ctr">
+            <a:solidFill>
+              <a:srgbClr val="FF0000"/>
+            </a:solidFill>
+            <a:prstDash val="solid"/>
+            <a:round/>
+            <a:headEnd type="none" w="med" len="med"/>
+            <a:tailEnd type="none" w="med" len="med"/>
+          </a:ln>
+        </p:spPr>
+        <p:style>
+          <a:lnRef idx="0">
+            <a:scrgbClr r="0" g="0" b="0"/>
+          </a:lnRef>
+          <a:fillRef idx="0">
+            <a:scrgbClr r="0" g="0" b="0"/>
+          </a:fillRef>
+          <a:effectRef idx="0">
+            <a:scrgbClr r="0" g="0" b="0"/>
+          </a:effectRef>
+          <a:fontRef idx="minor">
+            <a:schemeClr val="accent2"/>
+          </a:fontRef>
+        </p:style>
+        <p:txBody>
+          <a:bodyPr rtlCol="0" anchor="ctr"/>
+          <a:lstStyle/>
+          <a:p>
+            <a:pPr algn="ctr"/>
+            <a:endParaRPr lang="en-US"/>
+          </a:p>
+        </p:txBody>
+      </p:sp>
+    </p:spTree>
+    <p:extLst>
+      <p:ext uri="{BB962C8B-B14F-4D97-AF65-F5344CB8AC3E}">
+        <p14:creationId xmlns:p14="http://schemas.microsoft.com/office/powerpoint/2010/main" val="2105840589"/>
+      </p:ext>
+    </p:extLst>
+  </p:cSld>
+  <p:clrMapOvr>
+    <a:masterClrMapping/>
+  </p:clrMapOvr>
+</p:sld>
+</file>
+
+<file path=ppt/slides/slide7.xml><?xml version="1.0" encoding="utf-8"?>
+<p:sld xmlns:a="http://schemas.openxmlformats.org/drawingml/2006/main" xmlns:r="http://schemas.openxmlformats.org/officeDocument/2006/relationships" xmlns:p="http://schemas.openxmlformats.org/presentationml/2006/main">
+  <p:cSld>
+    <p:spTree>
+      <p:nvGrpSpPr>
+        <p:cNvPr id="1" name=""/>
+        <p:cNvGrpSpPr/>
+        <p:nvPr/>
+      </p:nvGrpSpPr>
+      <p:grpSpPr>
+        <a:xfrm>
+          <a:off x="0" y="0"/>
+          <a:ext cx="0" cy="0"/>
+          <a:chOff x="0" y="0"/>
+          <a:chExt cx="0" cy="0"/>
+        </a:xfrm>
+      </p:grpSpPr>
+      <p:pic>
+        <p:nvPicPr>
+          <p:cNvPr id="11" name="Picture 10">
+            <a:extLst>
+              <a:ext uri="{FF2B5EF4-FFF2-40B4-BE49-F238E27FC236}">
+                <a16:creationId xmlns:a16="http://schemas.microsoft.com/office/drawing/2014/main" id="{502E33D4-763D-4B56-9FCD-CB52E63DDE1A}"/>
+              </a:ext>
+            </a:extLst>
+          </p:cNvPr>
+          <p:cNvPicPr>
+            <a:picLocks noChangeAspect="1"/>
+          </p:cNvPicPr>
+          <p:nvPr/>
+        </p:nvPicPr>
+        <p:blipFill>
+          <a:blip r:embed="rId2"/>
+          <a:stretch>
+            <a:fillRect/>
+          </a:stretch>
+        </p:blipFill>
+        <p:spPr>
+          <a:xfrm>
+            <a:off x="3308129" y="1307205"/>
+            <a:ext cx="5092307" cy="4243589"/>
+          </a:xfrm>
+          <a:prstGeom prst="rect">
+            <a:avLst/>
+          </a:prstGeom>
+        </p:spPr>
+      </p:pic>
+      <p:sp>
+        <p:nvSpPr>
+          <p:cNvPr id="12" name="TextBox 11">
+            <a:extLst>
+              <a:ext uri="{FF2B5EF4-FFF2-40B4-BE49-F238E27FC236}">
+                <a16:creationId xmlns:a16="http://schemas.microsoft.com/office/drawing/2014/main" id="{6F47644D-4FE7-4674-9EFA-0ACF336A3139}"/>
+              </a:ext>
+            </a:extLst>
+          </p:cNvPr>
+          <p:cNvSpPr txBox="1"/>
+          <p:nvPr/>
+        </p:nvSpPr>
+        <p:spPr>
+          <a:xfrm>
+            <a:off x="5957978" y="706787"/>
+            <a:ext cx="2879035" cy="646331"/>
+          </a:xfrm>
+          <a:prstGeom prst="rect">
+            <a:avLst/>
+          </a:prstGeom>
+          <a:noFill/>
+        </p:spPr>
+        <p:txBody>
+          <a:bodyPr wrap="square" rtlCol="0">
+            <a:spAutoFit/>
+          </a:bodyPr>
+          <a:lstStyle/>
+          <a:p>
+            <a:r>
+              <a:rPr lang="en-US" dirty="0"/>
+              <a:t>Click to rate next image.</a:t>
+            </a:r>
+          </a:p>
+          <a:p>
+            <a:r>
+              <a:rPr lang="en-US" dirty="0"/>
+              <a:t>HIT progress.</a:t>
+            </a:r>
+          </a:p>
+        </p:txBody>
+      </p:sp>
+      <p:sp>
+        <p:nvSpPr>
+          <p:cNvPr id="3" name="Rectangle: Rounded Corners 2">
+            <a:extLst>
+              <a:ext uri="{FF2B5EF4-FFF2-40B4-BE49-F238E27FC236}">
+                <a16:creationId xmlns:a16="http://schemas.microsoft.com/office/drawing/2014/main" id="{DDF11BA7-53E3-4E47-B996-3EDC15F2BFCA}"/>
+              </a:ext>
+            </a:extLst>
+          </p:cNvPr>
+          <p:cNvSpPr/>
+          <p:nvPr/>
+        </p:nvSpPr>
+        <p:spPr>
+          <a:xfrm>
+            <a:off x="7104888" y="1399032"/>
+            <a:ext cx="1266551" cy="911509"/>
+          </a:xfrm>
+          <a:prstGeom prst="roundRect">
+            <a:avLst/>
+          </a:prstGeom>
+          <a:noFill/>
+          <a:ln w="28575" cap="flat" cmpd="sng" algn="ctr">
+            <a:solidFill>
+              <a:srgbClr val="FF0000"/>
+            </a:solidFill>
+            <a:prstDash val="solid"/>
+            <a:round/>
+            <a:headEnd type="none" w="med" len="med"/>
+            <a:tailEnd type="none" w="med" len="med"/>
+          </a:ln>
+        </p:spPr>
+        <p:style>
+          <a:lnRef idx="0">
+            <a:scrgbClr r="0" g="0" b="0"/>
+          </a:lnRef>
+          <a:fillRef idx="0">
+            <a:scrgbClr r="0" g="0" b="0"/>
+          </a:fillRef>
+          <a:effectRef idx="0">
+            <a:scrgbClr r="0" g="0" b="0"/>
+          </a:effectRef>
+          <a:fontRef idx="minor">
+            <a:schemeClr val="accent2"/>
+          </a:fontRef>
+        </p:style>
+        <p:txBody>
+          <a:bodyPr rtlCol="0" anchor="ctr"/>
+          <a:lstStyle/>
+          <a:p>
+            <a:pPr algn="ctr"/>
+            <a:endParaRPr lang="en-US"/>
+          </a:p>
+        </p:txBody>
+      </p:sp>
+      <p:cxnSp>
+        <p:nvCxnSpPr>
+          <p:cNvPr id="10" name="Straight Arrow Connector 9">
+            <a:extLst>
+              <a:ext uri="{FF2B5EF4-FFF2-40B4-BE49-F238E27FC236}">
+                <a16:creationId xmlns:a16="http://schemas.microsoft.com/office/drawing/2014/main" id="{4B835816-01FD-4C09-9350-0004EF020733}"/>
+              </a:ext>
+            </a:extLst>
+          </p:cNvPr>
+          <p:cNvCxnSpPr>
+            <a:cxnSpLocks/>
+            <a:stCxn id="3" idx="0"/>
+          </p:cNvCxnSpPr>
+          <p:nvPr/>
+        </p:nvCxnSpPr>
+        <p:spPr>
+          <a:xfrm flipH="1" flipV="1">
+            <a:off x="7397496" y="1125249"/>
+            <a:ext cx="340668" cy="273783"/>
+          </a:xfrm>
+          <a:prstGeom prst="straightConnector1">
+            <a:avLst/>
+          </a:prstGeom>
+          <a:ln w="38100">
+            <a:solidFill>
+              <a:srgbClr val="FF0000"/>
+            </a:solidFill>
+            <a:tailEnd type="triangle"/>
+          </a:ln>
+        </p:spPr>
+        <p:style>
+          <a:lnRef idx="1">
+            <a:schemeClr val="accent1"/>
+          </a:lnRef>
+          <a:fillRef idx="0">
+            <a:schemeClr val="accent1"/>
+          </a:fillRef>
+          <a:effectRef idx="0">
+            <a:schemeClr val="accent1"/>
+          </a:effectRef>
+          <a:fontRef idx="minor">
+            <a:schemeClr val="tx1"/>
+          </a:fontRef>
+        </p:style>
+      </p:cxnSp>
+    </p:spTree>
+    <p:extLst>
+      <p:ext uri="{BB962C8B-B14F-4D97-AF65-F5344CB8AC3E}">
+        <p14:creationId xmlns:p14="http://schemas.microsoft.com/office/powerpoint/2010/main" val="3121563881"/>
+      </p:ext>
+    </p:extLst>
+  </p:cSld>
+  <p:clrMapOvr>
+    <a:masterClrMapping/>
+  </p:clrMapOvr>
+</p:sld>
+</file>
+
+<file path=ppt/slides/slide8.xml><?xml version="1.0" encoding="utf-8"?>
+<p:sld xmlns:a="http://schemas.openxmlformats.org/drawingml/2006/main" xmlns:r="http://schemas.openxmlformats.org/officeDocument/2006/relationships" xmlns:p="http://schemas.openxmlformats.org/presentationml/2006/main">
+  <p:cSld>
+    <p:spTree>
+      <p:nvGrpSpPr>
+        <p:cNvPr id="1" name=""/>
+        <p:cNvGrpSpPr/>
+        <p:nvPr/>
+      </p:nvGrpSpPr>
+      <p:grpSpPr>
+        <a:xfrm>
+          <a:off x="0" y="0"/>
+          <a:ext cx="0" cy="0"/>
+          <a:chOff x="0" y="0"/>
+          <a:chExt cx="0" cy="0"/>
+        </a:xfrm>
+      </p:grpSpPr>
+      <p:pic>
+        <p:nvPicPr>
+          <p:cNvPr id="4" name="Picture 3">
+            <a:extLst>
+              <a:ext uri="{FF2B5EF4-FFF2-40B4-BE49-F238E27FC236}">
+                <a16:creationId xmlns:a16="http://schemas.microsoft.com/office/drawing/2014/main" id="{D7B592CD-F9BA-49A6-9AB1-BCD75ACCAA68}"/>
+              </a:ext>
+            </a:extLst>
+          </p:cNvPr>
+          <p:cNvPicPr>
+            <a:picLocks noChangeAspect="1"/>
+          </p:cNvPicPr>
+          <p:nvPr/>
+        </p:nvPicPr>
+        <p:blipFill>
+          <a:blip r:embed="rId2"/>
+          <a:stretch>
+            <a:fillRect/>
+          </a:stretch>
+        </p:blipFill>
+        <p:spPr>
+          <a:xfrm>
+            <a:off x="2262559" y="1351088"/>
+            <a:ext cx="5973916" cy="3905578"/>
+          </a:xfrm>
+          <a:prstGeom prst="rect">
+            <a:avLst/>
+          </a:prstGeom>
+        </p:spPr>
+      </p:pic>
+      <p:cxnSp>
+        <p:nvCxnSpPr>
+          <p:cNvPr id="11" name="Straight Arrow Connector 10">
+            <a:extLst>
+              <a:ext uri="{FF2B5EF4-FFF2-40B4-BE49-F238E27FC236}">
+                <a16:creationId xmlns:a16="http://schemas.microsoft.com/office/drawing/2014/main" id="{96787E16-0E97-4C05-ADFC-3B93F407678A}"/>
+              </a:ext>
+            </a:extLst>
+          </p:cNvPr>
+          <p:cNvCxnSpPr>
+            <a:cxnSpLocks/>
+            <a:endCxn id="12" idx="2"/>
+          </p:cNvCxnSpPr>
+          <p:nvPr/>
+        </p:nvCxnSpPr>
+        <p:spPr>
+          <a:xfrm flipV="1">
+            <a:off x="5106924" y="1162976"/>
+            <a:ext cx="0" cy="686224"/>
+          </a:xfrm>
+          <a:prstGeom prst="straightConnector1">
+            <a:avLst/>
+          </a:prstGeom>
+          <a:ln w="38100">
+            <a:solidFill>
+              <a:srgbClr val="FF0000"/>
+            </a:solidFill>
+            <a:tailEnd type="triangle"/>
+          </a:ln>
+        </p:spPr>
+        <p:style>
+          <a:lnRef idx="1">
+            <a:schemeClr val="accent1"/>
+          </a:lnRef>
+          <a:fillRef idx="0">
+            <a:schemeClr val="accent1"/>
+          </a:fillRef>
+          <a:effectRef idx="0">
+            <a:schemeClr val="accent1"/>
+          </a:effectRef>
+          <a:fontRef idx="minor">
+            <a:schemeClr val="tx1"/>
+          </a:fontRef>
+        </p:style>
+      </p:cxnSp>
+      <p:sp>
+        <p:nvSpPr>
+          <p:cNvPr id="12" name="TextBox 11">
+            <a:extLst>
+              <a:ext uri="{FF2B5EF4-FFF2-40B4-BE49-F238E27FC236}">
+                <a16:creationId xmlns:a16="http://schemas.microsoft.com/office/drawing/2014/main" id="{6F47644D-4FE7-4674-9EFA-0ACF336A3139}"/>
+              </a:ext>
+            </a:extLst>
+          </p:cNvPr>
+          <p:cNvSpPr txBox="1"/>
+          <p:nvPr/>
+        </p:nvSpPr>
+        <p:spPr>
+          <a:xfrm>
+            <a:off x="2386584" y="516645"/>
+            <a:ext cx="5440680" cy="646331"/>
+          </a:xfrm>
+          <a:prstGeom prst="rect">
+            <a:avLst/>
+          </a:prstGeom>
+          <a:noFill/>
+          <a:ln>
+            <a:solidFill>
+              <a:srgbClr val="FF0000"/>
+            </a:solidFill>
+          </a:ln>
+        </p:spPr>
+        <p:txBody>
+          <a:bodyPr wrap="square" rtlCol="0">
+            <a:spAutoFit/>
+          </a:bodyPr>
+          <a:lstStyle/>
+          <a:p>
+            <a:r>
+              <a:rPr lang="en-US" dirty="0"/>
+              <a:t>The HIT completion code will be printed in a new tab. </a:t>
+            </a:r>
+            <a:br>
+              <a:rPr lang="en-US" dirty="0"/>
+            </a:br>
+            <a:r>
+              <a:rPr lang="en-US" dirty="0"/>
+              <a:t>Paste it in the AMT designated box to finish.</a:t>
+            </a:r>
+          </a:p>
+        </p:txBody>
+      </p:sp>
+      <p:sp>
+        <p:nvSpPr>
+          <p:cNvPr id="3" name="Rectangle: Rounded Corners 2">
+            <a:extLst>
+              <a:ext uri="{FF2B5EF4-FFF2-40B4-BE49-F238E27FC236}">
+                <a16:creationId xmlns:a16="http://schemas.microsoft.com/office/drawing/2014/main" id="{DDF11BA7-53E3-4E47-B996-3EDC15F2BFCA}"/>
+              </a:ext>
+            </a:extLst>
+          </p:cNvPr>
+          <p:cNvSpPr/>
+          <p:nvPr/>
+        </p:nvSpPr>
+        <p:spPr>
+          <a:xfrm>
+            <a:off x="2262559" y="1849190"/>
+            <a:ext cx="6038556" cy="339510"/>
+          </a:xfrm>
+          <a:prstGeom prst="roundRect">
+            <a:avLst/>
+          </a:prstGeom>
+          <a:noFill/>
+          <a:ln w="28575" cap="flat" cmpd="sng" algn="ctr">
+            <a:solidFill>
+              <a:srgbClr val="FF0000"/>
+            </a:solidFill>
+            <a:prstDash val="solid"/>
+            <a:round/>
+            <a:headEnd type="none" w="med" len="med"/>
+            <a:tailEnd type="none" w="med" len="med"/>
+          </a:ln>
+        </p:spPr>
+        <p:style>
+          <a:lnRef idx="0">
+            <a:scrgbClr r="0" g="0" b="0"/>
+          </a:lnRef>
+          <a:fillRef idx="0">
+            <a:scrgbClr r="0" g="0" b="0"/>
+          </a:fillRef>
+          <a:effectRef idx="0">
+            <a:scrgbClr r="0" g="0" b="0"/>
+          </a:effectRef>
+          <a:fontRef idx="minor">
+            <a:schemeClr val="accent2"/>
+          </a:fontRef>
+        </p:style>
+        <p:txBody>
+          <a:bodyPr rtlCol="0" anchor="ctr"/>
+          <a:lstStyle/>
+          <a:p>
+            <a:pPr algn="ctr"/>
+            <a:endParaRPr lang="en-US"/>
+          </a:p>
+        </p:txBody>
+      </p:sp>
+      <p:sp>
+        <p:nvSpPr>
+          <p:cNvPr id="5" name="Rectangle 4">
+            <a:extLst>
+              <a:ext uri="{FF2B5EF4-FFF2-40B4-BE49-F238E27FC236}">
+                <a16:creationId xmlns:a16="http://schemas.microsoft.com/office/drawing/2014/main" id="{77F8B901-BCC4-44BA-871A-5098FCA4B17C}"/>
+              </a:ext>
+            </a:extLst>
+          </p:cNvPr>
+          <p:cNvSpPr/>
+          <p:nvPr/>
+        </p:nvSpPr>
+        <p:spPr>
+          <a:xfrm>
+            <a:off x="2262559" y="1351088"/>
+            <a:ext cx="5973904" cy="4155824"/>
+          </a:xfrm>
+          <a:prstGeom prst="rect">
+            <a:avLst/>
+          </a:prstGeom>
+          <a:noFill/>
+        </p:spPr>
+        <p:style>
+          <a:lnRef idx="2">
+            <a:schemeClr val="dk1"/>
+          </a:lnRef>
+          <a:fillRef idx="1">
+            <a:schemeClr val="lt1"/>
+          </a:fillRef>
+          <a:effectRef idx="0">
+            <a:schemeClr val="dk1"/>
+          </a:effectRef>
+          <a:fontRef idx="minor">
+            <a:schemeClr val="dk1"/>
+          </a:fontRef>
+        </p:style>
+        <p:txBody>
+          <a:bodyPr rtlCol="0" anchor="ctr"/>
+          <a:lstStyle/>
+          <a:p>
+            <a:pPr algn="ctr"/>
+            <a:endParaRPr lang="en-US"/>
+          </a:p>
+        </p:txBody>
+      </p:sp>
+      <p:sp>
+        <p:nvSpPr>
+          <p:cNvPr id="2" name="Rectangle 1">
+            <a:extLst>
+              <a:ext uri="{FF2B5EF4-FFF2-40B4-BE49-F238E27FC236}">
+                <a16:creationId xmlns:a16="http://schemas.microsoft.com/office/drawing/2014/main" id="{F7192B48-CA7D-4F6F-B8F5-9459FE05CF6E}"/>
+              </a:ext>
+            </a:extLst>
+          </p:cNvPr>
+          <p:cNvSpPr/>
+          <p:nvPr/>
+        </p:nvSpPr>
+        <p:spPr>
+          <a:xfrm>
+            <a:off x="3392424" y="2404872"/>
+            <a:ext cx="4690872" cy="2935224"/>
+          </a:xfrm>
+          <a:prstGeom prst="rect">
+            <a:avLst/>
+          </a:prstGeom>
+          <a:solidFill>
+            <a:schemeClr val="bg1"/>
+          </a:solidFill>
+          <a:ln>
+            <a:solidFill>
+              <a:schemeClr val="bg1"/>
+            </a:solidFill>
+          </a:ln>
+        </p:spPr>
+        <p:style>
+          <a:lnRef idx="2">
+            <a:schemeClr val="accent1">
+              <a:shade val="50000"/>
+            </a:schemeClr>
+          </a:lnRef>
+          <a:fillRef idx="1">
+            <a:schemeClr val="accent1"/>
+          </a:fillRef>
+          <a:effectRef idx="0">
+            <a:schemeClr val="accent1"/>
+          </a:effectRef>
+          <a:fontRef idx="minor">
+            <a:schemeClr val="lt1"/>
+          </a:fontRef>
+        </p:style>
+        <p:txBody>
+          <a:bodyPr rtlCol="0" anchor="ctr"/>
+          <a:lstStyle/>
+          <a:p>
+            <a:pPr algn="ctr"/>
+            <a:endParaRPr lang="en-US"/>
+          </a:p>
+        </p:txBody>
+      </p:sp>
+    </p:spTree>
+    <p:extLst>
+      <p:ext uri="{BB962C8B-B14F-4D97-AF65-F5344CB8AC3E}">
+        <p14:creationId xmlns:p14="http://schemas.microsoft.com/office/powerpoint/2010/main" val="790966529"/>
+      </p:ext>
+    </p:extLst>
+  </p:cSld>
+  <p:clrMapOvr>
+    <a:masterClrMapping/>
+  </p:clrMapOvr>
+</p:sld>
+</file>
+
 <file path=ppt/theme/theme1.xml><?xml version="1.0" encoding="utf-8"?>
 <a:theme xmlns:a="http://schemas.openxmlformats.org/drawingml/2006/main" name="Office Theme">
   <a:themeElements>

</xml_diff>